<commit_message>
Added VR Home Design
Added first draft of slides.
</commit_message>
<xml_diff>
--- a/Idea Presentation.pptx
+++ b/Idea Presentation.pptx
@@ -11,6 +11,12 @@
     <p:sldId id="259" r:id="rId5"/>
     <p:sldId id="260" r:id="rId6"/>
     <p:sldId id="261" r:id="rId7"/>
+    <p:sldId id="262" r:id="rId8"/>
+    <p:sldId id="263" r:id="rId9"/>
+    <p:sldId id="264" r:id="rId10"/>
+    <p:sldId id="265" r:id="rId11"/>
+    <p:sldId id="266" r:id="rId12"/>
+    <p:sldId id="267" r:id="rId13"/>
   </p:sldIdLst>
   <p:sldSz cx="12192000" cy="6858000"/>
   <p:notesSz cx="6858000" cy="9144000"/>
@@ -109,6 +115,11 @@
       </a:defRPr>
     </a:lvl9pPr>
   </p:defaultTextStyle>
+  <p:extLst>
+    <p:ext uri="{EFAFB233-063F-42B5-8137-9DF3F51BA10A}">
+      <p15:sldGuideLst xmlns:p15="http://schemas.microsoft.com/office/powerpoint/2012/main"/>
+    </p:ext>
+  </p:extLst>
 </p:presentation>
 </file>
 
@@ -834,7 +845,7 @@
           <a:p>
             <a:fld id="{1E4239BC-DEF6-4742-8689-DBD9BC4C0AA7}" type="datetimeFigureOut">
               <a:rPr lang="en-US" smtClean="0"/>
-              <a:t>8/10/2018</a:t>
+              <a:t>10/8/2018</a:t>
             </a:fld>
             <a:endParaRPr lang="en-US"/>
           </a:p>
@@ -1085,7 +1096,7 @@
           <a:p>
             <a:fld id="{1E4239BC-DEF6-4742-8689-DBD9BC4C0AA7}" type="datetimeFigureOut">
               <a:rPr lang="en-US" smtClean="0"/>
-              <a:t>8/10/2018</a:t>
+              <a:t>10/8/2018</a:t>
             </a:fld>
             <a:endParaRPr lang="en-US"/>
           </a:p>
@@ -1399,7 +1410,7 @@
           <a:p>
             <a:fld id="{1E4239BC-DEF6-4742-8689-DBD9BC4C0AA7}" type="datetimeFigureOut">
               <a:rPr lang="en-US" smtClean="0"/>
-              <a:t>8/10/2018</a:t>
+              <a:t>10/8/2018</a:t>
             </a:fld>
             <a:endParaRPr lang="en-US"/>
           </a:p>
@@ -1740,7 +1751,7 @@
           <a:p>
             <a:fld id="{1E4239BC-DEF6-4742-8689-DBD9BC4C0AA7}" type="datetimeFigureOut">
               <a:rPr lang="en-US" smtClean="0"/>
-              <a:t>8/10/2018</a:t>
+              <a:t>10/8/2018</a:t>
             </a:fld>
             <a:endParaRPr lang="en-US"/>
           </a:p>
@@ -2054,7 +2065,7 @@
           <a:p>
             <a:fld id="{1E4239BC-DEF6-4742-8689-DBD9BC4C0AA7}" type="datetimeFigureOut">
               <a:rPr lang="en-US" smtClean="0"/>
-              <a:t>8/10/2018</a:t>
+              <a:t>10/8/2018</a:t>
             </a:fld>
             <a:endParaRPr lang="en-US"/>
           </a:p>
@@ -2447,7 +2458,7 @@
           <a:p>
             <a:fld id="{1E4239BC-DEF6-4742-8689-DBD9BC4C0AA7}" type="datetimeFigureOut">
               <a:rPr lang="en-US" smtClean="0"/>
-              <a:t>8/10/2018</a:t>
+              <a:t>10/8/2018</a:t>
             </a:fld>
             <a:endParaRPr lang="en-US"/>
           </a:p>
@@ -2617,7 +2628,7 @@
           <a:p>
             <a:fld id="{1E4239BC-DEF6-4742-8689-DBD9BC4C0AA7}" type="datetimeFigureOut">
               <a:rPr lang="en-US" smtClean="0"/>
-              <a:t>8/10/2018</a:t>
+              <a:t>10/8/2018</a:t>
             </a:fld>
             <a:endParaRPr lang="en-US"/>
           </a:p>
@@ -2797,7 +2808,7 @@
           <a:p>
             <a:fld id="{1E4239BC-DEF6-4742-8689-DBD9BC4C0AA7}" type="datetimeFigureOut">
               <a:rPr lang="en-US" smtClean="0"/>
-              <a:t>8/10/2018</a:t>
+              <a:t>10/8/2018</a:t>
             </a:fld>
             <a:endParaRPr lang="en-US"/>
           </a:p>
@@ -2973,7 +2984,7 @@
           <a:p>
             <a:fld id="{1E4239BC-DEF6-4742-8689-DBD9BC4C0AA7}" type="datetimeFigureOut">
               <a:rPr lang="en-US" smtClean="0"/>
-              <a:t>8/10/2018</a:t>
+              <a:t>10/8/2018</a:t>
             </a:fld>
             <a:endParaRPr lang="en-US"/>
           </a:p>
@@ -3220,7 +3231,7 @@
           <a:p>
             <a:fld id="{1E4239BC-DEF6-4742-8689-DBD9BC4C0AA7}" type="datetimeFigureOut">
               <a:rPr lang="en-US" smtClean="0"/>
-              <a:t>8/10/2018</a:t>
+              <a:t>10/8/2018</a:t>
             </a:fld>
             <a:endParaRPr lang="en-US"/>
           </a:p>
@@ -3452,7 +3463,7 @@
           <a:p>
             <a:fld id="{1E4239BC-DEF6-4742-8689-DBD9BC4C0AA7}" type="datetimeFigureOut">
               <a:rPr lang="en-US" smtClean="0"/>
-              <a:t>8/10/2018</a:t>
+              <a:t>10/8/2018</a:t>
             </a:fld>
             <a:endParaRPr lang="en-US"/>
           </a:p>
@@ -3826,7 +3837,7 @@
           <a:p>
             <a:fld id="{1E4239BC-DEF6-4742-8689-DBD9BC4C0AA7}" type="datetimeFigureOut">
               <a:rPr lang="en-US" smtClean="0"/>
-              <a:t>8/10/2018</a:t>
+              <a:t>10/8/2018</a:t>
             </a:fld>
             <a:endParaRPr lang="en-US"/>
           </a:p>
@@ -3949,7 +3960,7 @@
           <a:p>
             <a:fld id="{1E4239BC-DEF6-4742-8689-DBD9BC4C0AA7}" type="datetimeFigureOut">
               <a:rPr lang="en-US" smtClean="0"/>
-              <a:t>8/10/2018</a:t>
+              <a:t>10/8/2018</a:t>
             </a:fld>
             <a:endParaRPr lang="en-US"/>
           </a:p>
@@ -4044,7 +4055,7 @@
           <a:p>
             <a:fld id="{1E4239BC-DEF6-4742-8689-DBD9BC4C0AA7}" type="datetimeFigureOut">
               <a:rPr lang="en-US" smtClean="0"/>
-              <a:t>8/10/2018</a:t>
+              <a:t>10/8/2018</a:t>
             </a:fld>
             <a:endParaRPr lang="en-US"/>
           </a:p>
@@ -4299,7 +4310,7 @@
           <a:p>
             <a:fld id="{1E4239BC-DEF6-4742-8689-DBD9BC4C0AA7}" type="datetimeFigureOut">
               <a:rPr lang="en-US" smtClean="0"/>
-              <a:t>8/10/2018</a:t>
+              <a:t>10/8/2018</a:t>
             </a:fld>
             <a:endParaRPr lang="en-US"/>
           </a:p>
@@ -4562,7 +4573,7 @@
           <a:p>
             <a:fld id="{1E4239BC-DEF6-4742-8689-DBD9BC4C0AA7}" type="datetimeFigureOut">
               <a:rPr lang="en-US" smtClean="0"/>
-              <a:t>8/10/2018</a:t>
+              <a:t>10/8/2018</a:t>
             </a:fld>
             <a:endParaRPr lang="en-US"/>
           </a:p>
@@ -5305,7 +5316,7 @@
           <a:p>
             <a:fld id="{1E4239BC-DEF6-4742-8689-DBD9BC4C0AA7}" type="datetimeFigureOut">
               <a:rPr lang="en-US" smtClean="0"/>
-              <a:t>8/10/2018</a:t>
+              <a:t>10/8/2018</a:t>
             </a:fld>
             <a:endParaRPr lang="en-US"/>
           </a:p>
@@ -5900,6 +5911,341 @@
 </p:sld>
 </file>
 
+<file path=ppt/slides/slide10.xml><?xml version="1.0" encoding="utf-8"?>
+<p:sld xmlns:a="http://schemas.openxmlformats.org/drawingml/2006/main" xmlns:r="http://schemas.openxmlformats.org/officeDocument/2006/relationships" xmlns:p="http://schemas.openxmlformats.org/presentationml/2006/main">
+  <p:cSld>
+    <p:spTree>
+      <p:nvGrpSpPr>
+        <p:cNvPr id="1" name=""/>
+        <p:cNvGrpSpPr/>
+        <p:nvPr/>
+      </p:nvGrpSpPr>
+      <p:grpSpPr>
+        <a:xfrm>
+          <a:off x="0" y="0"/>
+          <a:ext cx="0" cy="0"/>
+          <a:chOff x="0" y="0"/>
+          <a:chExt cx="0" cy="0"/>
+        </a:xfrm>
+      </p:grpSpPr>
+      <p:sp>
+        <p:nvSpPr>
+          <p:cNvPr id="2" name="Title 1">
+            <a:extLst>
+              <a:ext uri="{FF2B5EF4-FFF2-40B4-BE49-F238E27FC236}">
+                <a16:creationId xmlns:a16="http://schemas.microsoft.com/office/drawing/2014/main" id="{2C017A31-DC15-4B11-A97C-BCD1547CCE67}"/>
+              </a:ext>
+            </a:extLst>
+          </p:cNvPr>
+          <p:cNvSpPr>
+            <a:spLocks noGrp="1"/>
+          </p:cNvSpPr>
+          <p:nvPr>
+            <p:ph type="title"/>
+          </p:nvPr>
+        </p:nvSpPr>
+        <p:spPr/>
+        <p:txBody>
+          <a:bodyPr/>
+          <a:lstStyle/>
+          <a:p>
+            <a:r>
+              <a:rPr lang="en-US" dirty="0"/>
+              <a:t>Stretch Goals</a:t>
+            </a:r>
+          </a:p>
+        </p:txBody>
+      </p:sp>
+      <p:sp>
+        <p:nvSpPr>
+          <p:cNvPr id="3" name="Content Placeholder 2">
+            <a:extLst>
+              <a:ext uri="{FF2B5EF4-FFF2-40B4-BE49-F238E27FC236}">
+                <a16:creationId xmlns:a16="http://schemas.microsoft.com/office/drawing/2014/main" id="{492C1D28-7E7B-4A37-9640-8B45E193751D}"/>
+              </a:ext>
+            </a:extLst>
+          </p:cNvPr>
+          <p:cNvSpPr>
+            <a:spLocks noGrp="1"/>
+          </p:cNvSpPr>
+          <p:nvPr>
+            <p:ph idx="1"/>
+          </p:nvPr>
+        </p:nvSpPr>
+        <p:spPr/>
+        <p:txBody>
+          <a:bodyPr/>
+          <a:lstStyle/>
+          <a:p>
+            <a:r>
+              <a:rPr lang="en-US" dirty="0"/>
+              <a:t>Add custom object models as décor and furnishing</a:t>
+            </a:r>
+          </a:p>
+          <a:p>
+            <a:endParaRPr lang="en-US" dirty="0"/>
+          </a:p>
+          <a:p>
+            <a:r>
+              <a:rPr lang="en-US" dirty="0"/>
+              <a:t>Connect multiple users to roam among the same simulated home.</a:t>
+            </a:r>
+          </a:p>
+          <a:p>
+            <a:endParaRPr lang="en-US" dirty="0"/>
+          </a:p>
+          <a:p>
+            <a:r>
+              <a:rPr lang="en-US" dirty="0"/>
+              <a:t>Design templates</a:t>
+            </a:r>
+          </a:p>
+          <a:p>
+            <a:endParaRPr lang="en-US" dirty="0"/>
+          </a:p>
+          <a:p>
+            <a:r>
+              <a:rPr lang="en-US" dirty="0"/>
+              <a:t>Use of various building materials</a:t>
+            </a:r>
+          </a:p>
+          <a:p>
+            <a:endParaRPr lang="en-US" dirty="0"/>
+          </a:p>
+          <a:p>
+            <a:r>
+              <a:rPr lang="en-US" dirty="0"/>
+              <a:t>Advanced lighting simulation</a:t>
+            </a:r>
+          </a:p>
+        </p:txBody>
+      </p:sp>
+    </p:spTree>
+    <p:extLst>
+      <p:ext uri="{BB962C8B-B14F-4D97-AF65-F5344CB8AC3E}">
+        <p14:creationId xmlns:p14="http://schemas.microsoft.com/office/powerpoint/2010/main" val="40815852"/>
+      </p:ext>
+    </p:extLst>
+  </p:cSld>
+  <p:clrMapOvr>
+    <a:masterClrMapping/>
+  </p:clrMapOvr>
+</p:sld>
+</file>
+
+<file path=ppt/slides/slide11.xml><?xml version="1.0" encoding="utf-8"?>
+<p:sld xmlns:a="http://schemas.openxmlformats.org/drawingml/2006/main" xmlns:r="http://schemas.openxmlformats.org/officeDocument/2006/relationships" xmlns:p="http://schemas.openxmlformats.org/presentationml/2006/main">
+  <p:cSld>
+    <p:spTree>
+      <p:nvGrpSpPr>
+        <p:cNvPr id="1" name=""/>
+        <p:cNvGrpSpPr/>
+        <p:nvPr/>
+      </p:nvGrpSpPr>
+      <p:grpSpPr>
+        <a:xfrm>
+          <a:off x="0" y="0"/>
+          <a:ext cx="0" cy="0"/>
+          <a:chOff x="0" y="0"/>
+          <a:chExt cx="0" cy="0"/>
+        </a:xfrm>
+      </p:grpSpPr>
+      <p:sp>
+        <p:nvSpPr>
+          <p:cNvPr id="2" name="Title 1">
+            <a:extLst>
+              <a:ext uri="{FF2B5EF4-FFF2-40B4-BE49-F238E27FC236}">
+                <a16:creationId xmlns:a16="http://schemas.microsoft.com/office/drawing/2014/main" id="{AF13920C-BB43-4D64-AEB2-4C3E29B58BCF}"/>
+              </a:ext>
+            </a:extLst>
+          </p:cNvPr>
+          <p:cNvSpPr>
+            <a:spLocks noGrp="1"/>
+          </p:cNvSpPr>
+          <p:nvPr>
+            <p:ph type="title"/>
+          </p:nvPr>
+        </p:nvSpPr>
+        <p:spPr/>
+        <p:txBody>
+          <a:bodyPr/>
+          <a:lstStyle/>
+          <a:p>
+            <a:r>
+              <a:rPr lang="en-US" dirty="0"/>
+              <a:t>Pros</a:t>
+            </a:r>
+          </a:p>
+        </p:txBody>
+      </p:sp>
+      <p:sp>
+        <p:nvSpPr>
+          <p:cNvPr id="3" name="Content Placeholder 2">
+            <a:extLst>
+              <a:ext uri="{FF2B5EF4-FFF2-40B4-BE49-F238E27FC236}">
+                <a16:creationId xmlns:a16="http://schemas.microsoft.com/office/drawing/2014/main" id="{3179C2AB-42EE-40E6-9C91-E8921FBF6419}"/>
+              </a:ext>
+            </a:extLst>
+          </p:cNvPr>
+          <p:cNvSpPr>
+            <a:spLocks noGrp="1"/>
+          </p:cNvSpPr>
+          <p:nvPr>
+            <p:ph idx="1"/>
+          </p:nvPr>
+        </p:nvSpPr>
+        <p:spPr/>
+        <p:txBody>
+          <a:bodyPr/>
+          <a:lstStyle/>
+          <a:p>
+            <a:r>
+              <a:rPr lang="en-US" dirty="0"/>
+              <a:t>Game engines with built in VR support can be used for VR rendering assistance.</a:t>
+            </a:r>
+          </a:p>
+          <a:p>
+            <a:endParaRPr lang="en-US" dirty="0"/>
+          </a:p>
+          <a:p>
+            <a:r>
+              <a:rPr lang="en-US" dirty="0"/>
+              <a:t>Mobile VR is accessible</a:t>
+            </a:r>
+          </a:p>
+          <a:p>
+            <a:endParaRPr lang="en-US" dirty="0"/>
+          </a:p>
+          <a:p>
+            <a:r>
+              <a:rPr lang="en-US" dirty="0"/>
+              <a:t>Basic models of necessary items are obtainable</a:t>
+            </a:r>
+          </a:p>
+        </p:txBody>
+      </p:sp>
+    </p:spTree>
+    <p:extLst>
+      <p:ext uri="{BB962C8B-B14F-4D97-AF65-F5344CB8AC3E}">
+        <p14:creationId xmlns:p14="http://schemas.microsoft.com/office/powerpoint/2010/main" val="2374414570"/>
+      </p:ext>
+    </p:extLst>
+  </p:cSld>
+  <p:clrMapOvr>
+    <a:masterClrMapping/>
+  </p:clrMapOvr>
+</p:sld>
+</file>
+
+<file path=ppt/slides/slide12.xml><?xml version="1.0" encoding="utf-8"?>
+<p:sld xmlns:a="http://schemas.openxmlformats.org/drawingml/2006/main" xmlns:r="http://schemas.openxmlformats.org/officeDocument/2006/relationships" xmlns:p="http://schemas.openxmlformats.org/presentationml/2006/main">
+  <p:cSld>
+    <p:spTree>
+      <p:nvGrpSpPr>
+        <p:cNvPr id="1" name=""/>
+        <p:cNvGrpSpPr/>
+        <p:nvPr/>
+      </p:nvGrpSpPr>
+      <p:grpSpPr>
+        <a:xfrm>
+          <a:off x="0" y="0"/>
+          <a:ext cx="0" cy="0"/>
+          <a:chOff x="0" y="0"/>
+          <a:chExt cx="0" cy="0"/>
+        </a:xfrm>
+      </p:grpSpPr>
+      <p:sp>
+        <p:nvSpPr>
+          <p:cNvPr id="2" name="Title 1">
+            <a:extLst>
+              <a:ext uri="{FF2B5EF4-FFF2-40B4-BE49-F238E27FC236}">
+                <a16:creationId xmlns:a16="http://schemas.microsoft.com/office/drawing/2014/main" id="{5777E210-A554-4E80-87A1-656D7D269F95}"/>
+              </a:ext>
+            </a:extLst>
+          </p:cNvPr>
+          <p:cNvSpPr>
+            <a:spLocks noGrp="1"/>
+          </p:cNvSpPr>
+          <p:nvPr>
+            <p:ph type="title"/>
+          </p:nvPr>
+        </p:nvSpPr>
+        <p:spPr/>
+        <p:txBody>
+          <a:bodyPr/>
+          <a:lstStyle/>
+          <a:p>
+            <a:r>
+              <a:rPr lang="en-US" dirty="0"/>
+              <a:t>Cons</a:t>
+            </a:r>
+          </a:p>
+        </p:txBody>
+      </p:sp>
+      <p:sp>
+        <p:nvSpPr>
+          <p:cNvPr id="3" name="Content Placeholder 2">
+            <a:extLst>
+              <a:ext uri="{FF2B5EF4-FFF2-40B4-BE49-F238E27FC236}">
+                <a16:creationId xmlns:a16="http://schemas.microsoft.com/office/drawing/2014/main" id="{9A3E23BD-813F-45EB-999E-86239C0314A0}"/>
+              </a:ext>
+            </a:extLst>
+          </p:cNvPr>
+          <p:cNvSpPr>
+            <a:spLocks noGrp="1"/>
+          </p:cNvSpPr>
+          <p:nvPr>
+            <p:ph idx="1"/>
+          </p:nvPr>
+        </p:nvSpPr>
+        <p:spPr/>
+        <p:txBody>
+          <a:bodyPr/>
+          <a:lstStyle/>
+          <a:p>
+            <a:r>
+              <a:rPr lang="en-US" dirty="0"/>
+              <a:t>Computationally intensive</a:t>
+            </a:r>
+          </a:p>
+          <a:p>
+            <a:endParaRPr lang="en-US" dirty="0"/>
+          </a:p>
+          <a:p>
+            <a:r>
+              <a:rPr lang="en-US" dirty="0"/>
+              <a:t>Best method for input?</a:t>
+            </a:r>
+          </a:p>
+          <a:p>
+            <a:endParaRPr lang="en-US" dirty="0"/>
+          </a:p>
+          <a:p>
+            <a:r>
+              <a:rPr lang="en-US" dirty="0"/>
+              <a:t>Needs many </a:t>
+            </a:r>
+            <a:r>
+              <a:rPr lang="en-US"/>
+              <a:t>accessible models</a:t>
+            </a:r>
+            <a:endParaRPr lang="en-US" dirty="0"/>
+          </a:p>
+        </p:txBody>
+      </p:sp>
+    </p:spTree>
+    <p:extLst>
+      <p:ext uri="{BB962C8B-B14F-4D97-AF65-F5344CB8AC3E}">
+        <p14:creationId xmlns:p14="http://schemas.microsoft.com/office/powerpoint/2010/main" val="1489233388"/>
+      </p:ext>
+    </p:extLst>
+  </p:cSld>
+  <p:clrMapOvr>
+    <a:masterClrMapping/>
+  </p:clrMapOvr>
+</p:sld>
+</file>
+
 <file path=ppt/slides/slide2.xml><?xml version="1.0" encoding="utf-8"?>
 <p:sld xmlns:a="http://schemas.openxmlformats.org/drawingml/2006/main" xmlns:r="http://schemas.openxmlformats.org/officeDocument/2006/relationships" xmlns:p="http://schemas.openxmlformats.org/presentationml/2006/main">
   <p:cSld>
@@ -6429,6 +6775,318 @@
     <p:extLst>
       <p:ext uri="{BB962C8B-B14F-4D97-AF65-F5344CB8AC3E}">
         <p14:creationId xmlns:p14="http://schemas.microsoft.com/office/powerpoint/2010/main" val="4010448348"/>
+      </p:ext>
+    </p:extLst>
+  </p:cSld>
+  <p:clrMapOvr>
+    <a:masterClrMapping/>
+  </p:clrMapOvr>
+</p:sld>
+</file>
+
+<file path=ppt/slides/slide7.xml><?xml version="1.0" encoding="utf-8"?>
+<p:sld xmlns:a="http://schemas.openxmlformats.org/drawingml/2006/main" xmlns:r="http://schemas.openxmlformats.org/officeDocument/2006/relationships" xmlns:p="http://schemas.openxmlformats.org/presentationml/2006/main">
+  <p:cSld>
+    <p:spTree>
+      <p:nvGrpSpPr>
+        <p:cNvPr id="1" name=""/>
+        <p:cNvGrpSpPr/>
+        <p:nvPr/>
+      </p:nvGrpSpPr>
+      <p:grpSpPr>
+        <a:xfrm>
+          <a:off x="0" y="0"/>
+          <a:ext cx="0" cy="0"/>
+          <a:chOff x="0" y="0"/>
+          <a:chExt cx="0" cy="0"/>
+        </a:xfrm>
+      </p:grpSpPr>
+      <p:sp>
+        <p:nvSpPr>
+          <p:cNvPr id="4" name="Title 3">
+            <a:extLst>
+              <a:ext uri="{FF2B5EF4-FFF2-40B4-BE49-F238E27FC236}">
+                <a16:creationId xmlns:a16="http://schemas.microsoft.com/office/drawing/2014/main" id="{8D6D22D8-D557-4689-B746-B949F4316A51}"/>
+              </a:ext>
+            </a:extLst>
+          </p:cNvPr>
+          <p:cNvSpPr>
+            <a:spLocks noGrp="1"/>
+          </p:cNvSpPr>
+          <p:nvPr>
+            <p:ph type="ctrTitle"/>
+          </p:nvPr>
+        </p:nvSpPr>
+        <p:spPr/>
+        <p:txBody>
+          <a:bodyPr/>
+          <a:lstStyle/>
+          <a:p>
+            <a:r>
+              <a:rPr lang="en-US" dirty="0"/>
+              <a:t>VR Home Design</a:t>
+            </a:r>
+          </a:p>
+        </p:txBody>
+      </p:sp>
+      <p:sp>
+        <p:nvSpPr>
+          <p:cNvPr id="5" name="Subtitle 4">
+            <a:extLst>
+              <a:ext uri="{FF2B5EF4-FFF2-40B4-BE49-F238E27FC236}">
+                <a16:creationId xmlns:a16="http://schemas.microsoft.com/office/drawing/2014/main" id="{0D184CF6-7C0D-4E13-9148-637711A9080F}"/>
+              </a:ext>
+            </a:extLst>
+          </p:cNvPr>
+          <p:cNvSpPr>
+            <a:spLocks noGrp="1"/>
+          </p:cNvSpPr>
+          <p:nvPr>
+            <p:ph type="subTitle" idx="1"/>
+          </p:nvPr>
+        </p:nvSpPr>
+        <p:spPr/>
+        <p:txBody>
+          <a:bodyPr/>
+          <a:lstStyle/>
+          <a:p>
+            <a:endParaRPr lang="en-US"/>
+          </a:p>
+        </p:txBody>
+      </p:sp>
+    </p:spTree>
+    <p:extLst>
+      <p:ext uri="{BB962C8B-B14F-4D97-AF65-F5344CB8AC3E}">
+        <p14:creationId xmlns:p14="http://schemas.microsoft.com/office/powerpoint/2010/main" val="259945665"/>
+      </p:ext>
+    </p:extLst>
+  </p:cSld>
+  <p:clrMapOvr>
+    <a:masterClrMapping/>
+  </p:clrMapOvr>
+</p:sld>
+</file>
+
+<file path=ppt/slides/slide8.xml><?xml version="1.0" encoding="utf-8"?>
+<p:sld xmlns:a="http://schemas.openxmlformats.org/drawingml/2006/main" xmlns:r="http://schemas.openxmlformats.org/officeDocument/2006/relationships" xmlns:p="http://schemas.openxmlformats.org/presentationml/2006/main">
+  <p:cSld>
+    <p:spTree>
+      <p:nvGrpSpPr>
+        <p:cNvPr id="1" name=""/>
+        <p:cNvGrpSpPr/>
+        <p:nvPr/>
+      </p:nvGrpSpPr>
+      <p:grpSpPr>
+        <a:xfrm>
+          <a:off x="0" y="0"/>
+          <a:ext cx="0" cy="0"/>
+          <a:chOff x="0" y="0"/>
+          <a:chExt cx="0" cy="0"/>
+        </a:xfrm>
+      </p:grpSpPr>
+      <p:sp>
+        <p:nvSpPr>
+          <p:cNvPr id="2" name="Title 1">
+            <a:extLst>
+              <a:ext uri="{FF2B5EF4-FFF2-40B4-BE49-F238E27FC236}">
+                <a16:creationId xmlns:a16="http://schemas.microsoft.com/office/drawing/2014/main" id="{851A511B-A78C-44A0-BB78-98BC62ADD35D}"/>
+              </a:ext>
+            </a:extLst>
+          </p:cNvPr>
+          <p:cNvSpPr>
+            <a:spLocks noGrp="1"/>
+          </p:cNvSpPr>
+          <p:nvPr>
+            <p:ph type="title"/>
+          </p:nvPr>
+        </p:nvSpPr>
+        <p:spPr/>
+        <p:txBody>
+          <a:bodyPr/>
+          <a:lstStyle/>
+          <a:p>
+            <a:r>
+              <a:rPr lang="en-US" dirty="0"/>
+              <a:t>Description</a:t>
+            </a:r>
+          </a:p>
+        </p:txBody>
+      </p:sp>
+      <p:sp>
+        <p:nvSpPr>
+          <p:cNvPr id="3" name="Content Placeholder 2">
+            <a:extLst>
+              <a:ext uri="{FF2B5EF4-FFF2-40B4-BE49-F238E27FC236}">
+                <a16:creationId xmlns:a16="http://schemas.microsoft.com/office/drawing/2014/main" id="{F7884146-EE91-470E-9B71-E9405E74075A}"/>
+              </a:ext>
+            </a:extLst>
+          </p:cNvPr>
+          <p:cNvSpPr>
+            <a:spLocks noGrp="1"/>
+          </p:cNvSpPr>
+          <p:nvPr>
+            <p:ph idx="1"/>
+          </p:nvPr>
+        </p:nvSpPr>
+        <p:spPr/>
+        <p:txBody>
+          <a:bodyPr/>
+          <a:lstStyle/>
+          <a:p>
+            <a:r>
+              <a:rPr lang="en-US" dirty="0"/>
+              <a:t>A VR application that can assist in the basic design layout and décor of a home.</a:t>
+            </a:r>
+          </a:p>
+          <a:p>
+            <a:pPr marL="0" indent="0">
+              <a:buNone/>
+            </a:pPr>
+            <a:endParaRPr lang="en-US" dirty="0"/>
+          </a:p>
+          <a:p>
+            <a:r>
+              <a:rPr lang="en-US" dirty="0"/>
+              <a:t>Place décor and roam the rooms of a house of your making.</a:t>
+            </a:r>
+          </a:p>
+        </p:txBody>
+      </p:sp>
+    </p:spTree>
+    <p:extLst>
+      <p:ext uri="{BB962C8B-B14F-4D97-AF65-F5344CB8AC3E}">
+        <p14:creationId xmlns:p14="http://schemas.microsoft.com/office/powerpoint/2010/main" val="1629984565"/>
+      </p:ext>
+    </p:extLst>
+  </p:cSld>
+  <p:clrMapOvr>
+    <a:masterClrMapping/>
+  </p:clrMapOvr>
+</p:sld>
+</file>
+
+<file path=ppt/slides/slide9.xml><?xml version="1.0" encoding="utf-8"?>
+<p:sld xmlns:a="http://schemas.openxmlformats.org/drawingml/2006/main" xmlns:r="http://schemas.openxmlformats.org/officeDocument/2006/relationships" xmlns:p="http://schemas.openxmlformats.org/presentationml/2006/main">
+  <p:cSld>
+    <p:spTree>
+      <p:nvGrpSpPr>
+        <p:cNvPr id="1" name=""/>
+        <p:cNvGrpSpPr/>
+        <p:nvPr/>
+      </p:nvGrpSpPr>
+      <p:grpSpPr>
+        <a:xfrm>
+          <a:off x="0" y="0"/>
+          <a:ext cx="0" cy="0"/>
+          <a:chOff x="0" y="0"/>
+          <a:chExt cx="0" cy="0"/>
+        </a:xfrm>
+      </p:grpSpPr>
+      <p:sp>
+        <p:nvSpPr>
+          <p:cNvPr id="2" name="Title 1">
+            <a:extLst>
+              <a:ext uri="{FF2B5EF4-FFF2-40B4-BE49-F238E27FC236}">
+                <a16:creationId xmlns:a16="http://schemas.microsoft.com/office/drawing/2014/main" id="{D53AD350-E365-41F4-A4AF-5F61E5CCD3A5}"/>
+              </a:ext>
+            </a:extLst>
+          </p:cNvPr>
+          <p:cNvSpPr>
+            <a:spLocks noGrp="1"/>
+          </p:cNvSpPr>
+          <p:nvPr>
+            <p:ph type="title"/>
+          </p:nvPr>
+        </p:nvSpPr>
+        <p:spPr/>
+        <p:txBody>
+          <a:bodyPr/>
+          <a:lstStyle/>
+          <a:p>
+            <a:r>
+              <a:rPr lang="en-US" dirty="0"/>
+              <a:t>Core Features</a:t>
+            </a:r>
+          </a:p>
+        </p:txBody>
+      </p:sp>
+      <p:sp>
+        <p:nvSpPr>
+          <p:cNvPr id="3" name="Content Placeholder 2">
+            <a:extLst>
+              <a:ext uri="{FF2B5EF4-FFF2-40B4-BE49-F238E27FC236}">
+                <a16:creationId xmlns:a16="http://schemas.microsoft.com/office/drawing/2014/main" id="{A252E78C-864D-49E7-A253-2E9B1D31C296}"/>
+              </a:ext>
+            </a:extLst>
+          </p:cNvPr>
+          <p:cNvSpPr>
+            <a:spLocks noGrp="1"/>
+          </p:cNvSpPr>
+          <p:nvPr>
+            <p:ph idx="1"/>
+          </p:nvPr>
+        </p:nvSpPr>
+        <p:spPr/>
+        <p:txBody>
+          <a:bodyPr/>
+          <a:lstStyle/>
+          <a:p>
+            <a:r>
+              <a:rPr lang="en-US" dirty="0"/>
+              <a:t>Move around the home in VR</a:t>
+            </a:r>
+          </a:p>
+          <a:p>
+            <a:pPr marL="0" indent="0">
+              <a:buNone/>
+            </a:pPr>
+            <a:endParaRPr lang="en-US" dirty="0"/>
+          </a:p>
+          <a:p>
+            <a:r>
+              <a:rPr lang="en-US" dirty="0"/>
+              <a:t>Place and resize rooms</a:t>
+            </a:r>
+          </a:p>
+          <a:p>
+            <a:pPr marL="0" indent="0">
+              <a:buNone/>
+            </a:pPr>
+            <a:endParaRPr lang="en-US" dirty="0"/>
+          </a:p>
+          <a:p>
+            <a:r>
+              <a:rPr lang="en-US" dirty="0"/>
+              <a:t>Save your work</a:t>
+            </a:r>
+          </a:p>
+          <a:p>
+            <a:pPr marL="0" indent="0">
+              <a:buNone/>
+            </a:pPr>
+            <a:endParaRPr lang="en-US" dirty="0"/>
+          </a:p>
+          <a:p>
+            <a:r>
+              <a:rPr lang="en-US" dirty="0"/>
+              <a:t>Add basic furnishing and décor to the room.</a:t>
+            </a:r>
+          </a:p>
+          <a:p>
+            <a:endParaRPr lang="en-US" dirty="0"/>
+          </a:p>
+          <a:p>
+            <a:r>
+              <a:rPr lang="en-US" dirty="0"/>
+              <a:t>Design within VR</a:t>
+            </a:r>
+          </a:p>
+        </p:txBody>
+      </p:sp>
+    </p:spTree>
+    <p:extLst>
+      <p:ext uri="{BB962C8B-B14F-4D97-AF65-F5344CB8AC3E}">
+        <p14:creationId xmlns:p14="http://schemas.microsoft.com/office/powerpoint/2010/main" val="1375053454"/>
       </p:ext>
     </p:extLst>
   </p:cSld>

</xml_diff>